<commit_message>
iniciando criação de slides a partir do roteiro
</commit_message>
<xml_diff>
--- a/Criação/newpresentation.pptx
+++ b/Criação/newpresentation.pptx
@@ -131,7 +131,7 @@
               <c:strCache>
                 <c:ptCount val="1"/>
                 <c:pt idx="0">
-                  <c:v>Series 1</c:v>
+                  <c:v>Produção (t)</c:v>
                 </c:pt>
               </c:strCache>
             </c:strRef>
@@ -142,13 +142,13 @@
               <c:strCache>
                 <c:ptCount val="3"/>
                 <c:pt idx="0">
-                  <c:v>A</c:v>
+                  <c:v>Banana</c:v>
                 </c:pt>
                 <c:pt idx="1">
-                  <c:v>B</c:v>
+                  <c:v>Laranja</c:v>
                 </c:pt>
                 <c:pt idx="2">
-                  <c:v>C</c:v>
+                  <c:v>Uva</c:v>
                 </c:pt>
               </c:strCache>
             </c:strRef>
@@ -3230,7 +3230,7 @@
           <a:lstStyle/>
           <a:p>
             <a:r>
-              <a:t>ANALYSTRISING</a:t>
+              <a:t>CRIAÇÃO DE SLIDES USANDO IA</a:t>
             </a:r>
           </a:p>
         </p:txBody>
@@ -3251,7 +3251,7 @@
           <a:lstStyle/>
           <a:p>
             <a:r>
-              <a:t>Subscribe me</a:t>
+              <a:t>Luiz Carlos de Lemos</a:t>
             </a:r>
           </a:p>
         </p:txBody>
@@ -3290,7 +3290,7 @@
           <a:lstStyle/>
           <a:p>
             <a:r>
-              <a:t>now for some bullet points</a:t>
+              <a:t>Testar Alguns Tópicos</a:t>
             </a:r>
           </a:p>
         </p:txBody>
@@ -3311,25 +3311,25 @@
           <a:lstStyle/>
           <a:p>
             <a:r>
-              <a:t>Subscribe</a:t>
+              <a:t>Nível 0</a:t>
             </a:r>
           </a:p>
           <a:p>
             <a:pPr lvl="1"/>
             <a:r>
-              <a:t>to</a:t>
+              <a:t>Nível 1</a:t>
             </a:r>
           </a:p>
           <a:p>
             <a:pPr lvl="2"/>
             <a:r>
-              <a:t>my</a:t>
+              <a:t>Nível 2</a:t>
             </a:r>
           </a:p>
           <a:p>
             <a:pPr lvl="3"/>
             <a:r>
-              <a:t>channel</a:t>
+              <a:t>Nível 3</a:t>
             </a:r>
           </a:p>
         </p:txBody>
@@ -3368,11 +3368,35 @@
           <a:lstStyle/>
           <a:p>
             <a:r>
-              <a:t>there's no picture!!!</a:t>
-            </a:r>
-          </a:p>
-        </p:txBody>
-      </p:sp>
+              <a:t>Incluir Uma Figura</a:t>
+            </a:r>
+          </a:p>
+        </p:txBody>
+      </p:sp>
+      <p:pic>
+        <p:nvPicPr>
+          <p:cNvPr id="3" name="Picture 2" descr="presentation.jpg"/>
+          <p:cNvPicPr>
+            <a:picLocks noChangeAspect="1"/>
+          </p:cNvPicPr>
+          <p:nvPr/>
+        </p:nvPicPr>
+        <p:blipFill>
+          <a:blip r:embed="rId2"/>
+          <a:stretch>
+            <a:fillRect/>
+          </a:stretch>
+        </p:blipFill>
+        <p:spPr>
+          <a:xfrm>
+            <a:off x="2743200" y="1828800"/>
+            <a:ext cx="3810000" cy="1809750"/>
+          </a:xfrm>
+          <a:prstGeom prst="rect">
+            <a:avLst/>
+          </a:prstGeom>
+        </p:spPr>
+      </p:pic>
     </p:spTree>
   </p:cSld>
   <p:clrMapOvr>
@@ -3407,7 +3431,7 @@
           <a:lstStyle/>
           <a:p>
             <a:r>
-              <a:t>shapework</a:t>
+              <a:t>Formatos e Formas</a:t>
             </a:r>
           </a:p>
         </p:txBody>
@@ -3523,7 +3547,7 @@
           <a:lstStyle/>
           <a:p>
             <a:r>
-              <a:t>Graphs</a:t>
+              <a:t>Gráficos</a:t>
             </a:r>
           </a:p>
         </p:txBody>
@@ -3580,7 +3604,7 @@
           <a:lstStyle/>
           <a:p>
             <a:r>
-              <a:t>table</a:t>
+              <a:t>Tabela</a:t>
             </a:r>
           </a:p>
         </p:txBody>
@@ -3616,7 +3640,7 @@
                     <a:lstStyle/>
                     <a:p>
                       <a:r>
-                        <a:t>Insert Title Here</a:t>
+                        <a:t>Aluno</a:t>
                       </a:r>
                     </a:p>
                   </a:txBody>
@@ -3626,7 +3650,11 @@
                   <a:txBody>
                     <a:bodyPr/>
                     <a:lstStyle/>
-                    <a:p/>
+                    <a:p>
+                      <a:r>
+                        <a:t>Nota</a:t>
+                      </a:r>
+                    </a:p>
                   </a:txBody>
                   <a:tcPr/>
                 </a:tc>
@@ -3654,7 +3682,7 @@
                     <a:lstStyle/>
                     <a:p>
                       <a:r>
-                        <a:t>Another Title Here</a:t>
+                        <a:t>José Maria</a:t>
                       </a:r>
                     </a:p>
                   </a:txBody>
@@ -3664,7 +3692,11 @@
                   <a:txBody>
                     <a:bodyPr/>
                     <a:lstStyle/>
-                    <a:p/>
+                    <a:p>
+                      <a:r>
+                        <a:t>8.7</a:t>
+                      </a:r>
+                    </a:p>
                   </a:txBody>
                   <a:tcPr/>
                 </a:tc>
@@ -3757,7 +3789,7 @@
           <a:lstStyle/>
           <a:p>
             <a:r>
-              <a:t>hyperlinks</a:t>
+              <a:t>Hyperlinks</a:t>
             </a:r>
           </a:p>
         </p:txBody>
@@ -3781,7 +3813,7 @@
               <a:rPr>
                 <a:hlinkClick r:id="rId2"/>
               </a:rPr>
-              <a:t>Google Hyperlink</a:t>
+              <a:t>Google</a:t>
             </a:r>
           </a:p>
         </p:txBody>

</xml_diff>